<commit_message>
data analysis pipeline file updated
</commit_message>
<xml_diff>
--- a/docs/telco_churn_pipeline.pptx
+++ b/docs/telco_churn_pipeline.pptx
@@ -6,7 +6,6 @@
   </p:sldMasterIdLst>
   <p:sldIdLst>
     <p:sldId id="258" r:id="rId2"/>
-    <p:sldId id="257" r:id="rId3"/>
   </p:sldIdLst>
   <p:sldSz cx="12192000" cy="6858000"/>
   <p:notesSz cx="6858000" cy="9144000"/>
@@ -262,7 +261,7 @@
           <a:p>
             <a:fld id="{F1B5DF15-9FC3-4DE1-93F9-AE91F8D737DA}" type="datetimeFigureOut">
               <a:rPr lang="en-CA" smtClean="0"/>
-              <a:t>2021-11-25</a:t>
+              <a:t>2021-12-09</a:t>
             </a:fld>
             <a:endParaRPr lang="en-CA"/>
           </a:p>
@@ -462,7 +461,7 @@
           <a:p>
             <a:fld id="{F1B5DF15-9FC3-4DE1-93F9-AE91F8D737DA}" type="datetimeFigureOut">
               <a:rPr lang="en-CA" smtClean="0"/>
-              <a:t>2021-11-25</a:t>
+              <a:t>2021-12-09</a:t>
             </a:fld>
             <a:endParaRPr lang="en-CA"/>
           </a:p>
@@ -672,7 +671,7 @@
           <a:p>
             <a:fld id="{F1B5DF15-9FC3-4DE1-93F9-AE91F8D737DA}" type="datetimeFigureOut">
               <a:rPr lang="en-CA" smtClean="0"/>
-              <a:t>2021-11-25</a:t>
+              <a:t>2021-12-09</a:t>
             </a:fld>
             <a:endParaRPr lang="en-CA"/>
           </a:p>
@@ -872,7 +871,7 @@
           <a:p>
             <a:fld id="{F1B5DF15-9FC3-4DE1-93F9-AE91F8D737DA}" type="datetimeFigureOut">
               <a:rPr lang="en-CA" smtClean="0"/>
-              <a:t>2021-11-25</a:t>
+              <a:t>2021-12-09</a:t>
             </a:fld>
             <a:endParaRPr lang="en-CA"/>
           </a:p>
@@ -1148,7 +1147,7 @@
           <a:p>
             <a:fld id="{F1B5DF15-9FC3-4DE1-93F9-AE91F8D737DA}" type="datetimeFigureOut">
               <a:rPr lang="en-CA" smtClean="0"/>
-              <a:t>2021-11-25</a:t>
+              <a:t>2021-12-09</a:t>
             </a:fld>
             <a:endParaRPr lang="en-CA"/>
           </a:p>
@@ -1416,7 +1415,7 @@
           <a:p>
             <a:fld id="{F1B5DF15-9FC3-4DE1-93F9-AE91F8D737DA}" type="datetimeFigureOut">
               <a:rPr lang="en-CA" smtClean="0"/>
-              <a:t>2021-11-25</a:t>
+              <a:t>2021-12-09</a:t>
             </a:fld>
             <a:endParaRPr lang="en-CA"/>
           </a:p>
@@ -1831,7 +1830,7 @@
           <a:p>
             <a:fld id="{F1B5DF15-9FC3-4DE1-93F9-AE91F8D737DA}" type="datetimeFigureOut">
               <a:rPr lang="en-CA" smtClean="0"/>
-              <a:t>2021-11-25</a:t>
+              <a:t>2021-12-09</a:t>
             </a:fld>
             <a:endParaRPr lang="en-CA"/>
           </a:p>
@@ -1973,7 +1972,7 @@
           <a:p>
             <a:fld id="{F1B5DF15-9FC3-4DE1-93F9-AE91F8D737DA}" type="datetimeFigureOut">
               <a:rPr lang="en-CA" smtClean="0"/>
-              <a:t>2021-11-25</a:t>
+              <a:t>2021-12-09</a:t>
             </a:fld>
             <a:endParaRPr lang="en-CA"/>
           </a:p>
@@ -2086,7 +2085,7 @@
           <a:p>
             <a:fld id="{F1B5DF15-9FC3-4DE1-93F9-AE91F8D737DA}" type="datetimeFigureOut">
               <a:rPr lang="en-CA" smtClean="0"/>
-              <a:t>2021-11-25</a:t>
+              <a:t>2021-12-09</a:t>
             </a:fld>
             <a:endParaRPr lang="en-CA"/>
           </a:p>
@@ -2399,7 +2398,7 @@
           <a:p>
             <a:fld id="{F1B5DF15-9FC3-4DE1-93F9-AE91F8D737DA}" type="datetimeFigureOut">
               <a:rPr lang="en-CA" smtClean="0"/>
-              <a:t>2021-11-25</a:t>
+              <a:t>2021-12-09</a:t>
             </a:fld>
             <a:endParaRPr lang="en-CA"/>
           </a:p>
@@ -2688,7 +2687,7 @@
           <a:p>
             <a:fld id="{F1B5DF15-9FC3-4DE1-93F9-AE91F8D737DA}" type="datetimeFigureOut">
               <a:rPr lang="en-CA" smtClean="0"/>
-              <a:t>2021-11-25</a:t>
+              <a:t>2021-12-09</a:t>
             </a:fld>
             <a:endParaRPr lang="en-CA"/>
           </a:p>
@@ -2931,7 +2930,7 @@
           <a:p>
             <a:fld id="{F1B5DF15-9FC3-4DE1-93F9-AE91F8D737DA}" type="datetimeFigureOut">
               <a:rPr lang="en-CA" smtClean="0"/>
-              <a:t>2021-11-25</a:t>
+              <a:t>2021-12-09</a:t>
             </a:fld>
             <a:endParaRPr lang="en-CA"/>
           </a:p>
@@ -3391,1415 +3390,6 @@
 </p:sld>
 </file>
 
-<file path=ppt/slides/slide2.xml><?xml version="1.0" encoding="utf-8"?>
-<p:sld xmlns:a="http://schemas.openxmlformats.org/drawingml/2006/main" xmlns:r="http://schemas.openxmlformats.org/officeDocument/2006/relationships" xmlns:p="http://schemas.openxmlformats.org/presentationml/2006/main">
-  <p:cSld>
-    <p:spTree>
-      <p:nvGrpSpPr>
-        <p:cNvPr id="1" name=""/>
-        <p:cNvGrpSpPr/>
-        <p:nvPr/>
-      </p:nvGrpSpPr>
-      <p:grpSpPr>
-        <a:xfrm>
-          <a:off x="0" y="0"/>
-          <a:ext cx="0" cy="0"/>
-          <a:chOff x="0" y="0"/>
-          <a:chExt cx="0" cy="0"/>
-        </a:xfrm>
-      </p:grpSpPr>
-      <p:sp>
-        <p:nvSpPr>
-          <p:cNvPr id="4" name="Flowchart: Magnetic Disk 3">
-            <a:extLst>
-              <a:ext uri="{FF2B5EF4-FFF2-40B4-BE49-F238E27FC236}">
-                <a16:creationId xmlns:a16="http://schemas.microsoft.com/office/drawing/2014/main" id="{C8FCD83E-4DFE-4173-80DB-4AFD193906EA}"/>
-              </a:ext>
-            </a:extLst>
-          </p:cNvPr>
-          <p:cNvSpPr/>
-          <p:nvPr/>
-        </p:nvSpPr>
-        <p:spPr>
-          <a:xfrm>
-            <a:off x="3296472" y="1257297"/>
-            <a:ext cx="1172817" cy="1232452"/>
-          </a:xfrm>
-          <a:prstGeom prst="flowChartMagneticDisk">
-            <a:avLst/>
-          </a:prstGeom>
-        </p:spPr>
-        <p:style>
-          <a:lnRef idx="2">
-            <a:schemeClr val="accent1">
-              <a:shade val="50000"/>
-            </a:schemeClr>
-          </a:lnRef>
-          <a:fillRef idx="1">
-            <a:schemeClr val="accent1"/>
-          </a:fillRef>
-          <a:effectRef idx="0">
-            <a:schemeClr val="accent1"/>
-          </a:effectRef>
-          <a:fontRef idx="minor">
-            <a:schemeClr val="lt1"/>
-          </a:fontRef>
-        </p:style>
-        <p:txBody>
-          <a:bodyPr rtlCol="0" anchor="ctr"/>
-          <a:lstStyle/>
-          <a:p>
-            <a:pPr algn="ctr"/>
-            <a:r>
-              <a:rPr lang="en-US" dirty="0"/>
-              <a:t>data/raw/churn.csv</a:t>
-            </a:r>
-            <a:endParaRPr lang="en-CA" dirty="0"/>
-          </a:p>
-        </p:txBody>
-      </p:sp>
-      <p:sp>
-        <p:nvSpPr>
-          <p:cNvPr id="5" name="Rectangle 4">
-            <a:extLst>
-              <a:ext uri="{FF2B5EF4-FFF2-40B4-BE49-F238E27FC236}">
-                <a16:creationId xmlns:a16="http://schemas.microsoft.com/office/drawing/2014/main" id="{191BD31E-8A7F-4710-860A-C47E071B164C}"/>
-              </a:ext>
-            </a:extLst>
-          </p:cNvPr>
-          <p:cNvSpPr/>
-          <p:nvPr/>
-        </p:nvSpPr>
-        <p:spPr>
-          <a:xfrm>
-            <a:off x="5015944" y="1381538"/>
-            <a:ext cx="1948069" cy="964096"/>
-          </a:xfrm>
-          <a:prstGeom prst="rect">
-            <a:avLst/>
-          </a:prstGeom>
-          <a:solidFill>
-            <a:schemeClr val="accent6">
-              <a:lumMod val="60000"/>
-              <a:lumOff val="40000"/>
-            </a:schemeClr>
-          </a:solidFill>
-        </p:spPr>
-        <p:style>
-          <a:lnRef idx="2">
-            <a:schemeClr val="accent1">
-              <a:shade val="50000"/>
-            </a:schemeClr>
-          </a:lnRef>
-          <a:fillRef idx="1">
-            <a:schemeClr val="accent1"/>
-          </a:fillRef>
-          <a:effectRef idx="0">
-            <a:schemeClr val="accent1"/>
-          </a:effectRef>
-          <a:fontRef idx="minor">
-            <a:schemeClr val="lt1"/>
-          </a:fontRef>
-        </p:style>
-        <p:txBody>
-          <a:bodyPr rtlCol="0" anchor="ctr"/>
-          <a:lstStyle/>
-          <a:p>
-            <a:pPr algn="ctr"/>
-            <a:r>
-              <a:rPr lang="en-US" dirty="0"/>
-              <a:t>src/preprocessed.py</a:t>
-            </a:r>
-            <a:endParaRPr lang="en-CA" dirty="0"/>
-          </a:p>
-        </p:txBody>
-      </p:sp>
-      <p:sp>
-        <p:nvSpPr>
-          <p:cNvPr id="6" name="Rectangle 5">
-            <a:extLst>
-              <a:ext uri="{FF2B5EF4-FFF2-40B4-BE49-F238E27FC236}">
-                <a16:creationId xmlns:a16="http://schemas.microsoft.com/office/drawing/2014/main" id="{53DA2B1B-1690-4656-A135-5BF8C4727042}"/>
-              </a:ext>
-            </a:extLst>
-          </p:cNvPr>
-          <p:cNvSpPr/>
-          <p:nvPr/>
-        </p:nvSpPr>
-        <p:spPr>
-          <a:xfrm>
-            <a:off x="7563677" y="1371599"/>
-            <a:ext cx="1948069" cy="964096"/>
-          </a:xfrm>
-          <a:prstGeom prst="rect">
-            <a:avLst/>
-          </a:prstGeom>
-          <a:solidFill>
-            <a:schemeClr val="accent6">
-              <a:lumMod val="60000"/>
-              <a:lumOff val="40000"/>
-            </a:schemeClr>
-          </a:solidFill>
-        </p:spPr>
-        <p:style>
-          <a:lnRef idx="2">
-            <a:schemeClr val="accent1">
-              <a:shade val="50000"/>
-            </a:schemeClr>
-          </a:lnRef>
-          <a:fillRef idx="1">
-            <a:schemeClr val="accent1"/>
-          </a:fillRef>
-          <a:effectRef idx="0">
-            <a:schemeClr val="accent1"/>
-          </a:effectRef>
-          <a:fontRef idx="minor">
-            <a:schemeClr val="lt1"/>
-          </a:fontRef>
-        </p:style>
-        <p:txBody>
-          <a:bodyPr rtlCol="0" anchor="ctr"/>
-          <a:lstStyle/>
-          <a:p>
-            <a:pPr algn="ctr"/>
-            <a:r>
-              <a:rPr lang="en-US" dirty="0"/>
-              <a:t>src/eda.py</a:t>
-            </a:r>
-            <a:endParaRPr lang="en-CA" dirty="0"/>
-          </a:p>
-        </p:txBody>
-      </p:sp>
-      <p:sp>
-        <p:nvSpPr>
-          <p:cNvPr id="7" name="Rectangle 6">
-            <a:extLst>
-              <a:ext uri="{FF2B5EF4-FFF2-40B4-BE49-F238E27FC236}">
-                <a16:creationId xmlns:a16="http://schemas.microsoft.com/office/drawing/2014/main" id="{1E7E473D-9FBD-4348-A856-2819F0E08301}"/>
-              </a:ext>
-            </a:extLst>
-          </p:cNvPr>
-          <p:cNvSpPr/>
-          <p:nvPr/>
-        </p:nvSpPr>
-        <p:spPr>
-          <a:xfrm>
-            <a:off x="858078" y="4343398"/>
-            <a:ext cx="1948069" cy="964096"/>
-          </a:xfrm>
-          <a:prstGeom prst="rect">
-            <a:avLst/>
-          </a:prstGeom>
-          <a:solidFill>
-            <a:schemeClr val="accent6">
-              <a:lumMod val="60000"/>
-              <a:lumOff val="40000"/>
-            </a:schemeClr>
-          </a:solidFill>
-        </p:spPr>
-        <p:style>
-          <a:lnRef idx="2">
-            <a:schemeClr val="accent1">
-              <a:shade val="50000"/>
-            </a:schemeClr>
-          </a:lnRef>
-          <a:fillRef idx="1">
-            <a:schemeClr val="accent1"/>
-          </a:fillRef>
-          <a:effectRef idx="0">
-            <a:schemeClr val="accent1"/>
-          </a:effectRef>
-          <a:fontRef idx="minor">
-            <a:schemeClr val="lt1"/>
-          </a:fontRef>
-        </p:style>
-        <p:txBody>
-          <a:bodyPr rtlCol="0" anchor="ctr"/>
-          <a:lstStyle/>
-          <a:p>
-            <a:pPr algn="ctr"/>
-            <a:r>
-              <a:rPr lang="en-US" dirty="0"/>
-              <a:t>src/tune_model.py</a:t>
-            </a:r>
-            <a:endParaRPr lang="en-CA" dirty="0"/>
-          </a:p>
-        </p:txBody>
-      </p:sp>
-      <p:sp>
-        <p:nvSpPr>
-          <p:cNvPr id="9" name="Flowchart: Magnetic Disk 8">
-            <a:extLst>
-              <a:ext uri="{FF2B5EF4-FFF2-40B4-BE49-F238E27FC236}">
-                <a16:creationId xmlns:a16="http://schemas.microsoft.com/office/drawing/2014/main" id="{F5EAEC64-341B-41A9-9950-4659B6B3586E}"/>
-              </a:ext>
-            </a:extLst>
-          </p:cNvPr>
-          <p:cNvSpPr/>
-          <p:nvPr/>
-        </p:nvSpPr>
-        <p:spPr>
-          <a:xfrm>
-            <a:off x="4038592" y="2855841"/>
-            <a:ext cx="1434554" cy="964096"/>
-          </a:xfrm>
-          <a:prstGeom prst="flowChartMagneticDisk">
-            <a:avLst/>
-          </a:prstGeom>
-        </p:spPr>
-        <p:style>
-          <a:lnRef idx="2">
-            <a:schemeClr val="accent1">
-              <a:shade val="50000"/>
-            </a:schemeClr>
-          </a:lnRef>
-          <a:fillRef idx="1">
-            <a:schemeClr val="accent1"/>
-          </a:fillRef>
-          <a:effectRef idx="0">
-            <a:schemeClr val="accent1"/>
-          </a:effectRef>
-          <a:fontRef idx="minor">
-            <a:schemeClr val="lt1"/>
-          </a:fontRef>
-        </p:style>
-        <p:txBody>
-          <a:bodyPr rtlCol="0" anchor="ctr"/>
-          <a:lstStyle/>
-          <a:p>
-            <a:pPr algn="ctr"/>
-            <a:r>
-              <a:rPr lang="en-US" dirty="0"/>
-              <a:t>data/processed/train.csv</a:t>
-            </a:r>
-            <a:endParaRPr lang="en-CA" dirty="0"/>
-          </a:p>
-        </p:txBody>
-      </p:sp>
-      <p:sp>
-        <p:nvSpPr>
-          <p:cNvPr id="10" name="Flowchart: Magnetic Disk 9">
-            <a:extLst>
-              <a:ext uri="{FF2B5EF4-FFF2-40B4-BE49-F238E27FC236}">
-                <a16:creationId xmlns:a16="http://schemas.microsoft.com/office/drawing/2014/main" id="{03973D8C-A646-42B6-B2D4-8A1CFEA5CBCD}"/>
-              </a:ext>
-            </a:extLst>
-          </p:cNvPr>
-          <p:cNvSpPr/>
-          <p:nvPr/>
-        </p:nvSpPr>
-        <p:spPr>
-          <a:xfrm>
-            <a:off x="6215268" y="2857499"/>
-            <a:ext cx="1434555" cy="982317"/>
-          </a:xfrm>
-          <a:prstGeom prst="flowChartMagneticDisk">
-            <a:avLst/>
-          </a:prstGeom>
-        </p:spPr>
-        <p:style>
-          <a:lnRef idx="2">
-            <a:schemeClr val="accent1">
-              <a:shade val="50000"/>
-            </a:schemeClr>
-          </a:lnRef>
-          <a:fillRef idx="1">
-            <a:schemeClr val="accent1"/>
-          </a:fillRef>
-          <a:effectRef idx="0">
-            <a:schemeClr val="accent1"/>
-          </a:effectRef>
-          <a:fontRef idx="minor">
-            <a:schemeClr val="lt1"/>
-          </a:fontRef>
-        </p:style>
-        <p:txBody>
-          <a:bodyPr rtlCol="0" anchor="ctr"/>
-          <a:lstStyle/>
-          <a:p>
-            <a:pPr algn="ctr"/>
-            <a:r>
-              <a:rPr lang="en-US" dirty="0"/>
-              <a:t>data/processed/test.csv</a:t>
-            </a:r>
-            <a:endParaRPr lang="en-CA" dirty="0"/>
-          </a:p>
-        </p:txBody>
-      </p:sp>
-      <p:sp>
-        <p:nvSpPr>
-          <p:cNvPr id="12" name="Rectangle 11">
-            <a:extLst>
-              <a:ext uri="{FF2B5EF4-FFF2-40B4-BE49-F238E27FC236}">
-                <a16:creationId xmlns:a16="http://schemas.microsoft.com/office/drawing/2014/main" id="{2B6B050A-7460-4809-8AF8-53C856236435}"/>
-              </a:ext>
-            </a:extLst>
-          </p:cNvPr>
-          <p:cNvSpPr/>
-          <p:nvPr/>
-        </p:nvSpPr>
-        <p:spPr>
-          <a:xfrm>
-            <a:off x="573159" y="1401415"/>
-            <a:ext cx="1948069" cy="964096"/>
-          </a:xfrm>
-          <a:prstGeom prst="rect">
-            <a:avLst/>
-          </a:prstGeom>
-          <a:solidFill>
-            <a:schemeClr val="accent6">
-              <a:lumMod val="60000"/>
-              <a:lumOff val="40000"/>
-            </a:schemeClr>
-          </a:solidFill>
-        </p:spPr>
-        <p:style>
-          <a:lnRef idx="2">
-            <a:schemeClr val="accent1">
-              <a:shade val="50000"/>
-            </a:schemeClr>
-          </a:lnRef>
-          <a:fillRef idx="1">
-            <a:schemeClr val="accent1"/>
-          </a:fillRef>
-          <a:effectRef idx="0">
-            <a:schemeClr val="accent1"/>
-          </a:effectRef>
-          <a:fontRef idx="minor">
-            <a:schemeClr val="lt1"/>
-          </a:fontRef>
-        </p:style>
-        <p:txBody>
-          <a:bodyPr rtlCol="0" anchor="ctr"/>
-          <a:lstStyle/>
-          <a:p>
-            <a:pPr algn="ctr"/>
-            <a:r>
-              <a:rPr lang="en-US" dirty="0"/>
-              <a:t>src/data_download.py</a:t>
-            </a:r>
-            <a:endParaRPr lang="en-CA" dirty="0"/>
-          </a:p>
-        </p:txBody>
-      </p:sp>
-      <p:sp>
-        <p:nvSpPr>
-          <p:cNvPr id="13" name="Rectangle 12">
-            <a:extLst>
-              <a:ext uri="{FF2B5EF4-FFF2-40B4-BE49-F238E27FC236}">
-                <a16:creationId xmlns:a16="http://schemas.microsoft.com/office/drawing/2014/main" id="{D16DD51D-96C2-4F3B-8CDF-783928FC2AA6}"/>
-              </a:ext>
-            </a:extLst>
-          </p:cNvPr>
-          <p:cNvSpPr/>
-          <p:nvPr/>
-        </p:nvSpPr>
-        <p:spPr>
-          <a:xfrm>
-            <a:off x="3296472" y="4343398"/>
-            <a:ext cx="1948069" cy="964096"/>
-          </a:xfrm>
-          <a:prstGeom prst="rect">
-            <a:avLst/>
-          </a:prstGeom>
-          <a:solidFill>
-            <a:schemeClr val="accent6">
-              <a:lumMod val="60000"/>
-              <a:lumOff val="40000"/>
-            </a:schemeClr>
-          </a:solidFill>
-        </p:spPr>
-        <p:style>
-          <a:lnRef idx="2">
-            <a:schemeClr val="accent1">
-              <a:shade val="50000"/>
-            </a:schemeClr>
-          </a:lnRef>
-          <a:fillRef idx="1">
-            <a:schemeClr val="accent1"/>
-          </a:fillRef>
-          <a:effectRef idx="0">
-            <a:schemeClr val="accent1"/>
-          </a:effectRef>
-          <a:fontRef idx="minor">
-            <a:schemeClr val="lt1"/>
-          </a:fontRef>
-        </p:style>
-        <p:txBody>
-          <a:bodyPr rtlCol="0" anchor="ctr"/>
-          <a:lstStyle/>
-          <a:p>
-            <a:pPr algn="ctr"/>
-            <a:r>
-              <a:rPr lang="en-US" dirty="0"/>
-              <a:t>src/test_model.py</a:t>
-            </a:r>
-            <a:endParaRPr lang="en-CA" dirty="0"/>
-          </a:p>
-        </p:txBody>
-      </p:sp>
-      <p:sp>
-        <p:nvSpPr>
-          <p:cNvPr id="16" name="Flowchart: Magnetic Disk 15">
-            <a:extLst>
-              <a:ext uri="{FF2B5EF4-FFF2-40B4-BE49-F238E27FC236}">
-                <a16:creationId xmlns:a16="http://schemas.microsoft.com/office/drawing/2014/main" id="{9EF4758E-505A-4A6D-B0C6-E3D2571ECF4D}"/>
-              </a:ext>
-            </a:extLst>
-          </p:cNvPr>
-          <p:cNvSpPr/>
-          <p:nvPr/>
-        </p:nvSpPr>
-        <p:spPr>
-          <a:xfrm>
-            <a:off x="1040303" y="5652052"/>
-            <a:ext cx="1593567" cy="964096"/>
-          </a:xfrm>
-          <a:prstGeom prst="flowChartMagneticDisk">
-            <a:avLst/>
-          </a:prstGeom>
-        </p:spPr>
-        <p:style>
-          <a:lnRef idx="2">
-            <a:schemeClr val="accent1">
-              <a:shade val="50000"/>
-            </a:schemeClr>
-          </a:lnRef>
-          <a:fillRef idx="1">
-            <a:schemeClr val="accent1"/>
-          </a:fillRef>
-          <a:effectRef idx="0">
-            <a:schemeClr val="accent1"/>
-          </a:effectRef>
-          <a:fontRef idx="minor">
-            <a:schemeClr val="lt1"/>
-          </a:fontRef>
-        </p:style>
-        <p:txBody>
-          <a:bodyPr rtlCol="0" anchor="ctr"/>
-          <a:lstStyle/>
-          <a:p>
-            <a:pPr algn="ctr"/>
-            <a:r>
-              <a:rPr lang="en-US" dirty="0"/>
-              <a:t>models/</a:t>
-            </a:r>
-          </a:p>
-          <a:p>
-            <a:pPr algn="ctr"/>
-            <a:r>
-              <a:rPr lang="en-US" dirty="0"/>
-              <a:t>model1.pkl</a:t>
-            </a:r>
-            <a:endParaRPr lang="en-CA" dirty="0"/>
-          </a:p>
-        </p:txBody>
-      </p:sp>
-      <p:sp>
-        <p:nvSpPr>
-          <p:cNvPr id="18" name="Rectangle 17">
-            <a:extLst>
-              <a:ext uri="{FF2B5EF4-FFF2-40B4-BE49-F238E27FC236}">
-                <a16:creationId xmlns:a16="http://schemas.microsoft.com/office/drawing/2014/main" id="{E0B540D0-BBCA-4D88-B583-521ACC64BBCC}"/>
-              </a:ext>
-            </a:extLst>
-          </p:cNvPr>
-          <p:cNvSpPr/>
-          <p:nvPr/>
-        </p:nvSpPr>
-        <p:spPr>
-          <a:xfrm>
-            <a:off x="6861310" y="4359966"/>
-            <a:ext cx="1948069" cy="964096"/>
-          </a:xfrm>
-          <a:prstGeom prst="rect">
-            <a:avLst/>
-          </a:prstGeom>
-        </p:spPr>
-        <p:style>
-          <a:lnRef idx="2">
-            <a:schemeClr val="accent1">
-              <a:shade val="50000"/>
-            </a:schemeClr>
-          </a:lnRef>
-          <a:fillRef idx="1">
-            <a:schemeClr val="accent1"/>
-          </a:fillRef>
-          <a:effectRef idx="0">
-            <a:schemeClr val="accent1"/>
-          </a:effectRef>
-          <a:fontRef idx="minor">
-            <a:schemeClr val="lt1"/>
-          </a:fontRef>
-        </p:style>
-        <p:txBody>
-          <a:bodyPr rtlCol="0" anchor="ctr"/>
-          <a:lstStyle/>
-          <a:p>
-            <a:pPr algn="ctr"/>
-            <a:r>
-              <a:rPr lang="en-US" dirty="0"/>
-              <a:t>doc/</a:t>
-            </a:r>
-            <a:r>
-              <a:rPr lang="en-US" dirty="0" err="1"/>
-              <a:t>analysis.ipbny</a:t>
-            </a:r>
-            <a:endParaRPr lang="en-CA" dirty="0"/>
-          </a:p>
-        </p:txBody>
-      </p:sp>
-      <p:cxnSp>
-        <p:nvCxnSpPr>
-          <p:cNvPr id="22" name="Straight Arrow Connector 21">
-            <a:extLst>
-              <a:ext uri="{FF2B5EF4-FFF2-40B4-BE49-F238E27FC236}">
-                <a16:creationId xmlns:a16="http://schemas.microsoft.com/office/drawing/2014/main" id="{B7889AA0-B867-4B35-8BF1-2D76885E3FDC}"/>
-              </a:ext>
-            </a:extLst>
-          </p:cNvPr>
-          <p:cNvCxnSpPr>
-            <a:stCxn id="12" idx="3"/>
-            <a:endCxn id="4" idx="2"/>
-          </p:cNvCxnSpPr>
-          <p:nvPr/>
-        </p:nvCxnSpPr>
-        <p:spPr>
-          <a:xfrm flipV="1">
-            <a:off x="2521228" y="1873523"/>
-            <a:ext cx="775244" cy="9940"/>
-          </a:xfrm>
-          <a:prstGeom prst="straightConnector1">
-            <a:avLst/>
-          </a:prstGeom>
-          <a:ln>
-            <a:tailEnd type="triangle"/>
-          </a:ln>
-        </p:spPr>
-        <p:style>
-          <a:lnRef idx="1">
-            <a:schemeClr val="accent1"/>
-          </a:lnRef>
-          <a:fillRef idx="0">
-            <a:schemeClr val="accent1"/>
-          </a:fillRef>
-          <a:effectRef idx="0">
-            <a:schemeClr val="accent1"/>
-          </a:effectRef>
-          <a:fontRef idx="minor">
-            <a:schemeClr val="tx1"/>
-          </a:fontRef>
-        </p:style>
-      </p:cxnSp>
-      <p:cxnSp>
-        <p:nvCxnSpPr>
-          <p:cNvPr id="23" name="Straight Arrow Connector 22">
-            <a:extLst>
-              <a:ext uri="{FF2B5EF4-FFF2-40B4-BE49-F238E27FC236}">
-                <a16:creationId xmlns:a16="http://schemas.microsoft.com/office/drawing/2014/main" id="{F780F131-BF94-4BE4-AA2D-4455DB868644}"/>
-              </a:ext>
-            </a:extLst>
-          </p:cNvPr>
-          <p:cNvCxnSpPr>
-            <a:cxnSpLocks/>
-            <a:stCxn id="4" idx="4"/>
-            <a:endCxn id="5" idx="1"/>
-          </p:cNvCxnSpPr>
-          <p:nvPr/>
-        </p:nvCxnSpPr>
-        <p:spPr>
-          <a:xfrm flipV="1">
-            <a:off x="4469289" y="1863586"/>
-            <a:ext cx="546655" cy="9937"/>
-          </a:xfrm>
-          <a:prstGeom prst="straightConnector1">
-            <a:avLst/>
-          </a:prstGeom>
-          <a:ln>
-            <a:tailEnd type="triangle"/>
-          </a:ln>
-        </p:spPr>
-        <p:style>
-          <a:lnRef idx="1">
-            <a:schemeClr val="accent1"/>
-          </a:lnRef>
-          <a:fillRef idx="0">
-            <a:schemeClr val="accent1"/>
-          </a:fillRef>
-          <a:effectRef idx="0">
-            <a:schemeClr val="accent1"/>
-          </a:effectRef>
-          <a:fontRef idx="minor">
-            <a:schemeClr val="tx1"/>
-          </a:fontRef>
-        </p:style>
-      </p:cxnSp>
-      <p:cxnSp>
-        <p:nvCxnSpPr>
-          <p:cNvPr id="26" name="Straight Arrow Connector 25">
-            <a:extLst>
-              <a:ext uri="{FF2B5EF4-FFF2-40B4-BE49-F238E27FC236}">
-                <a16:creationId xmlns:a16="http://schemas.microsoft.com/office/drawing/2014/main" id="{926F8BF9-2E77-4104-BE2C-73092D16D433}"/>
-              </a:ext>
-            </a:extLst>
-          </p:cNvPr>
-          <p:cNvCxnSpPr>
-            <a:cxnSpLocks/>
-            <a:stCxn id="5" idx="3"/>
-          </p:cNvCxnSpPr>
-          <p:nvPr/>
-        </p:nvCxnSpPr>
-        <p:spPr>
-          <a:xfrm>
-            <a:off x="6964013" y="1863586"/>
-            <a:ext cx="599664" cy="1"/>
-          </a:xfrm>
-          <a:prstGeom prst="straightConnector1">
-            <a:avLst/>
-          </a:prstGeom>
-          <a:ln>
-            <a:tailEnd type="triangle"/>
-          </a:ln>
-        </p:spPr>
-        <p:style>
-          <a:lnRef idx="1">
-            <a:schemeClr val="accent1"/>
-          </a:lnRef>
-          <a:fillRef idx="0">
-            <a:schemeClr val="accent1"/>
-          </a:fillRef>
-          <a:effectRef idx="0">
-            <a:schemeClr val="accent1"/>
-          </a:effectRef>
-          <a:fontRef idx="minor">
-            <a:schemeClr val="tx1"/>
-          </a:fontRef>
-        </p:style>
-      </p:cxnSp>
-      <p:cxnSp>
-        <p:nvCxnSpPr>
-          <p:cNvPr id="27" name="Straight Arrow Connector 26">
-            <a:extLst>
-              <a:ext uri="{FF2B5EF4-FFF2-40B4-BE49-F238E27FC236}">
-                <a16:creationId xmlns:a16="http://schemas.microsoft.com/office/drawing/2014/main" id="{EF07AADB-3F88-43BB-AC77-82124D26C2E0}"/>
-              </a:ext>
-            </a:extLst>
-          </p:cNvPr>
-          <p:cNvCxnSpPr>
-            <a:cxnSpLocks/>
-            <a:stCxn id="6" idx="3"/>
-            <a:endCxn id="73" idx="1"/>
-          </p:cNvCxnSpPr>
-          <p:nvPr/>
-        </p:nvCxnSpPr>
-        <p:spPr>
-          <a:xfrm>
-            <a:off x="9511746" y="1853647"/>
-            <a:ext cx="599664" cy="2485"/>
-          </a:xfrm>
-          <a:prstGeom prst="straightConnector1">
-            <a:avLst/>
-          </a:prstGeom>
-          <a:ln>
-            <a:tailEnd type="triangle"/>
-          </a:ln>
-        </p:spPr>
-        <p:style>
-          <a:lnRef idx="1">
-            <a:schemeClr val="accent1"/>
-          </a:lnRef>
-          <a:fillRef idx="0">
-            <a:schemeClr val="accent1"/>
-          </a:fillRef>
-          <a:effectRef idx="0">
-            <a:schemeClr val="accent1"/>
-          </a:effectRef>
-          <a:fontRef idx="minor">
-            <a:schemeClr val="tx1"/>
-          </a:fontRef>
-        </p:style>
-      </p:cxnSp>
-      <p:cxnSp>
-        <p:nvCxnSpPr>
-          <p:cNvPr id="32" name="Straight Arrow Connector 31">
-            <a:extLst>
-              <a:ext uri="{FF2B5EF4-FFF2-40B4-BE49-F238E27FC236}">
-                <a16:creationId xmlns:a16="http://schemas.microsoft.com/office/drawing/2014/main" id="{FB72BC85-A8A4-4770-BDE4-4876F62BCAB1}"/>
-              </a:ext>
-            </a:extLst>
-          </p:cNvPr>
-          <p:cNvCxnSpPr>
-            <a:cxnSpLocks/>
-            <a:stCxn id="7" idx="3"/>
-            <a:endCxn id="13" idx="1"/>
-          </p:cNvCxnSpPr>
-          <p:nvPr/>
-        </p:nvCxnSpPr>
-        <p:spPr>
-          <a:xfrm>
-            <a:off x="2806147" y="4825446"/>
-            <a:ext cx="490325" cy="0"/>
-          </a:xfrm>
-          <a:prstGeom prst="straightConnector1">
-            <a:avLst/>
-          </a:prstGeom>
-          <a:ln>
-            <a:tailEnd type="triangle"/>
-          </a:ln>
-        </p:spPr>
-        <p:style>
-          <a:lnRef idx="1">
-            <a:schemeClr val="accent1"/>
-          </a:lnRef>
-          <a:fillRef idx="0">
-            <a:schemeClr val="accent1"/>
-          </a:fillRef>
-          <a:effectRef idx="0">
-            <a:schemeClr val="accent1"/>
-          </a:effectRef>
-          <a:fontRef idx="minor">
-            <a:schemeClr val="tx1"/>
-          </a:fontRef>
-        </p:style>
-      </p:cxnSp>
-      <p:cxnSp>
-        <p:nvCxnSpPr>
-          <p:cNvPr id="36" name="Connector: Elbow 35">
-            <a:extLst>
-              <a:ext uri="{FF2B5EF4-FFF2-40B4-BE49-F238E27FC236}">
-                <a16:creationId xmlns:a16="http://schemas.microsoft.com/office/drawing/2014/main" id="{5237091A-B442-41F2-8139-99A40E677981}"/>
-              </a:ext>
-            </a:extLst>
-          </p:cNvPr>
-          <p:cNvCxnSpPr>
-            <a:cxnSpLocks/>
-            <a:stCxn id="5" idx="2"/>
-            <a:endCxn id="9" idx="1"/>
-          </p:cNvCxnSpPr>
-          <p:nvPr/>
-        </p:nvCxnSpPr>
-        <p:spPr>
-          <a:xfrm rot="5400000">
-            <a:off x="5117821" y="1983682"/>
-            <a:ext cx="510207" cy="1234110"/>
-          </a:xfrm>
-          <a:prstGeom prst="bentConnector3">
-            <a:avLst/>
-          </a:prstGeom>
-          <a:ln>
-            <a:tailEnd type="triangle"/>
-          </a:ln>
-        </p:spPr>
-        <p:style>
-          <a:lnRef idx="1">
-            <a:schemeClr val="accent1"/>
-          </a:lnRef>
-          <a:fillRef idx="0">
-            <a:schemeClr val="accent1"/>
-          </a:fillRef>
-          <a:effectRef idx="0">
-            <a:schemeClr val="accent1"/>
-          </a:effectRef>
-          <a:fontRef idx="minor">
-            <a:schemeClr val="tx1"/>
-          </a:fontRef>
-        </p:style>
-      </p:cxnSp>
-      <p:cxnSp>
-        <p:nvCxnSpPr>
-          <p:cNvPr id="37" name="Connector: Elbow 36">
-            <a:extLst>
-              <a:ext uri="{FF2B5EF4-FFF2-40B4-BE49-F238E27FC236}">
-                <a16:creationId xmlns:a16="http://schemas.microsoft.com/office/drawing/2014/main" id="{29CFBD73-A348-43AF-8AA3-AD8163CF291C}"/>
-              </a:ext>
-            </a:extLst>
-          </p:cNvPr>
-          <p:cNvCxnSpPr>
-            <a:cxnSpLocks/>
-            <a:stCxn id="5" idx="2"/>
-            <a:endCxn id="10" idx="1"/>
-          </p:cNvCxnSpPr>
-          <p:nvPr/>
-        </p:nvCxnSpPr>
-        <p:spPr>
-          <a:xfrm rot="16200000" flipH="1">
-            <a:off x="6205330" y="2130282"/>
-            <a:ext cx="511865" cy="942567"/>
-          </a:xfrm>
-          <a:prstGeom prst="bentConnector3">
-            <a:avLst>
-              <a:gd name="adj1" fmla="val 50000"/>
-            </a:avLst>
-          </a:prstGeom>
-          <a:ln>
-            <a:tailEnd type="triangle"/>
-          </a:ln>
-        </p:spPr>
-        <p:style>
-          <a:lnRef idx="1">
-            <a:schemeClr val="accent1"/>
-          </a:lnRef>
-          <a:fillRef idx="0">
-            <a:schemeClr val="accent1"/>
-          </a:fillRef>
-          <a:effectRef idx="0">
-            <a:schemeClr val="accent1"/>
-          </a:effectRef>
-          <a:fontRef idx="minor">
-            <a:schemeClr val="tx1"/>
-          </a:fontRef>
-        </p:style>
-      </p:cxnSp>
-      <p:cxnSp>
-        <p:nvCxnSpPr>
-          <p:cNvPr id="40" name="Connector: Elbow 39">
-            <a:extLst>
-              <a:ext uri="{FF2B5EF4-FFF2-40B4-BE49-F238E27FC236}">
-                <a16:creationId xmlns:a16="http://schemas.microsoft.com/office/drawing/2014/main" id="{54BB7A9E-7BCB-43EC-AF0A-77295D991CCD}"/>
-              </a:ext>
-            </a:extLst>
-          </p:cNvPr>
-          <p:cNvCxnSpPr>
-            <a:cxnSpLocks/>
-            <a:stCxn id="9" idx="2"/>
-          </p:cNvCxnSpPr>
-          <p:nvPr/>
-        </p:nvCxnSpPr>
-        <p:spPr>
-          <a:xfrm rot="10800000" flipV="1">
-            <a:off x="1699590" y="3337889"/>
-            <a:ext cx="2339002" cy="1002198"/>
-          </a:xfrm>
-          <a:prstGeom prst="bentConnector3">
-            <a:avLst>
-              <a:gd name="adj1" fmla="val 50000"/>
-            </a:avLst>
-          </a:prstGeom>
-          <a:ln>
-            <a:tailEnd type="triangle"/>
-          </a:ln>
-        </p:spPr>
-        <p:style>
-          <a:lnRef idx="1">
-            <a:schemeClr val="accent1"/>
-          </a:lnRef>
-          <a:fillRef idx="0">
-            <a:schemeClr val="accent1"/>
-          </a:fillRef>
-          <a:effectRef idx="0">
-            <a:schemeClr val="accent1"/>
-          </a:effectRef>
-          <a:fontRef idx="minor">
-            <a:schemeClr val="tx1"/>
-          </a:fontRef>
-        </p:style>
-      </p:cxnSp>
-      <p:cxnSp>
-        <p:nvCxnSpPr>
-          <p:cNvPr id="45" name="Connector: Elbow 44">
-            <a:extLst>
-              <a:ext uri="{FF2B5EF4-FFF2-40B4-BE49-F238E27FC236}">
-                <a16:creationId xmlns:a16="http://schemas.microsoft.com/office/drawing/2014/main" id="{14C8271E-EE83-4242-9880-2B5E1A5CA5EE}"/>
-              </a:ext>
-            </a:extLst>
-          </p:cNvPr>
-          <p:cNvCxnSpPr>
-            <a:cxnSpLocks/>
-            <a:stCxn id="10" idx="3"/>
-            <a:endCxn id="13" idx="0"/>
-          </p:cNvCxnSpPr>
-          <p:nvPr/>
-        </p:nvCxnSpPr>
-        <p:spPr>
-          <a:xfrm rot="5400000">
-            <a:off x="5349736" y="2760588"/>
-            <a:ext cx="503582" cy="2662039"/>
-          </a:xfrm>
-          <a:prstGeom prst="bentConnector3">
-            <a:avLst>
-              <a:gd name="adj1" fmla="val 50000"/>
-            </a:avLst>
-          </a:prstGeom>
-          <a:ln>
-            <a:tailEnd type="triangle"/>
-          </a:ln>
-        </p:spPr>
-        <p:style>
-          <a:lnRef idx="1">
-            <a:schemeClr val="accent1"/>
-          </a:lnRef>
-          <a:fillRef idx="0">
-            <a:schemeClr val="accent1"/>
-          </a:fillRef>
-          <a:effectRef idx="0">
-            <a:schemeClr val="accent1"/>
-          </a:effectRef>
-          <a:fontRef idx="minor">
-            <a:schemeClr val="tx1"/>
-          </a:fontRef>
-        </p:style>
-      </p:cxnSp>
-      <p:cxnSp>
-        <p:nvCxnSpPr>
-          <p:cNvPr id="48" name="Straight Arrow Connector 47">
-            <a:extLst>
-              <a:ext uri="{FF2B5EF4-FFF2-40B4-BE49-F238E27FC236}">
-                <a16:creationId xmlns:a16="http://schemas.microsoft.com/office/drawing/2014/main" id="{29713038-C00A-487D-B33B-A9CB554B08BB}"/>
-              </a:ext>
-            </a:extLst>
-          </p:cNvPr>
-          <p:cNvCxnSpPr>
-            <a:cxnSpLocks/>
-            <a:stCxn id="7" idx="2"/>
-            <a:endCxn id="16" idx="1"/>
-          </p:cNvCxnSpPr>
-          <p:nvPr/>
-        </p:nvCxnSpPr>
-        <p:spPr>
-          <a:xfrm>
-            <a:off x="1832113" y="5307494"/>
-            <a:ext cx="4974" cy="344558"/>
-          </a:xfrm>
-          <a:prstGeom prst="straightConnector1">
-            <a:avLst/>
-          </a:prstGeom>
-          <a:ln>
-            <a:tailEnd type="triangle"/>
-          </a:ln>
-        </p:spPr>
-        <p:style>
-          <a:lnRef idx="1">
-            <a:schemeClr val="accent1"/>
-          </a:lnRef>
-          <a:fillRef idx="0">
-            <a:schemeClr val="accent1"/>
-          </a:fillRef>
-          <a:effectRef idx="0">
-            <a:schemeClr val="accent1"/>
-          </a:effectRef>
-          <a:fontRef idx="minor">
-            <a:schemeClr val="tx1"/>
-          </a:fontRef>
-        </p:style>
-      </p:cxnSp>
-      <p:cxnSp>
-        <p:nvCxnSpPr>
-          <p:cNvPr id="53" name="Connector: Elbow 52">
-            <a:extLst>
-              <a:ext uri="{FF2B5EF4-FFF2-40B4-BE49-F238E27FC236}">
-                <a16:creationId xmlns:a16="http://schemas.microsoft.com/office/drawing/2014/main" id="{9C838102-E261-4964-9930-1E1F60BB90F7}"/>
-              </a:ext>
-            </a:extLst>
-          </p:cNvPr>
-          <p:cNvCxnSpPr>
-            <a:cxnSpLocks/>
-          </p:cNvCxnSpPr>
-          <p:nvPr/>
-        </p:nvCxnSpPr>
-        <p:spPr>
-          <a:xfrm flipV="1">
-            <a:off x="2428466" y="5078897"/>
-            <a:ext cx="887898" cy="761997"/>
-          </a:xfrm>
-          <a:prstGeom prst="bentConnector3">
-            <a:avLst>
-              <a:gd name="adj1" fmla="val 55597"/>
-            </a:avLst>
-          </a:prstGeom>
-          <a:ln>
-            <a:tailEnd type="triangle"/>
-          </a:ln>
-        </p:spPr>
-        <p:style>
-          <a:lnRef idx="1">
-            <a:schemeClr val="accent1"/>
-          </a:lnRef>
-          <a:fillRef idx="0">
-            <a:schemeClr val="accent1"/>
-          </a:fillRef>
-          <a:effectRef idx="0">
-            <a:schemeClr val="accent1"/>
-          </a:effectRef>
-          <a:fontRef idx="minor">
-            <a:schemeClr val="tx1"/>
-          </a:fontRef>
-        </p:style>
-      </p:cxnSp>
-      <p:cxnSp>
-        <p:nvCxnSpPr>
-          <p:cNvPr id="57" name="Straight Arrow Connector 56">
-            <a:extLst>
-              <a:ext uri="{FF2B5EF4-FFF2-40B4-BE49-F238E27FC236}">
-                <a16:creationId xmlns:a16="http://schemas.microsoft.com/office/drawing/2014/main" id="{5C9281B5-CA0B-4206-8577-E16DB9D006F0}"/>
-              </a:ext>
-            </a:extLst>
-          </p:cNvPr>
-          <p:cNvCxnSpPr>
-            <a:cxnSpLocks/>
-            <a:stCxn id="13" idx="2"/>
-            <a:endCxn id="78" idx="0"/>
-          </p:cNvCxnSpPr>
-          <p:nvPr/>
-        </p:nvCxnSpPr>
-        <p:spPr>
-          <a:xfrm>
-            <a:off x="4270507" y="5307494"/>
-            <a:ext cx="1667" cy="344558"/>
-          </a:xfrm>
-          <a:prstGeom prst="straightConnector1">
-            <a:avLst/>
-          </a:prstGeom>
-          <a:ln>
-            <a:tailEnd type="triangle"/>
-          </a:ln>
-        </p:spPr>
-        <p:style>
-          <a:lnRef idx="1">
-            <a:schemeClr val="accent1"/>
-          </a:lnRef>
-          <a:fillRef idx="0">
-            <a:schemeClr val="accent1"/>
-          </a:fillRef>
-          <a:effectRef idx="0">
-            <a:schemeClr val="accent1"/>
-          </a:effectRef>
-          <a:fontRef idx="minor">
-            <a:schemeClr val="tx1"/>
-          </a:fontRef>
-        </p:style>
-      </p:cxnSp>
-      <p:cxnSp>
-        <p:nvCxnSpPr>
-          <p:cNvPr id="60" name="Connector: Elbow 59">
-            <a:extLst>
-              <a:ext uri="{FF2B5EF4-FFF2-40B4-BE49-F238E27FC236}">
-                <a16:creationId xmlns:a16="http://schemas.microsoft.com/office/drawing/2014/main" id="{353E59E4-AECF-49B7-B8F7-4587258932BE}"/>
-              </a:ext>
-            </a:extLst>
-          </p:cNvPr>
-          <p:cNvCxnSpPr>
-            <a:cxnSpLocks/>
-            <a:stCxn id="78" idx="3"/>
-            <a:endCxn id="18" idx="1"/>
-          </p:cNvCxnSpPr>
-          <p:nvPr/>
-        </p:nvCxnSpPr>
-        <p:spPr>
-          <a:xfrm flipV="1">
-            <a:off x="5165037" y="4842014"/>
-            <a:ext cx="1696273" cy="1262267"/>
-          </a:xfrm>
-          <a:prstGeom prst="bentConnector3">
-            <a:avLst>
-              <a:gd name="adj1" fmla="val 50000"/>
-            </a:avLst>
-          </a:prstGeom>
-          <a:ln>
-            <a:tailEnd type="triangle"/>
-          </a:ln>
-        </p:spPr>
-        <p:style>
-          <a:lnRef idx="1">
-            <a:schemeClr val="accent1"/>
-          </a:lnRef>
-          <a:fillRef idx="0">
-            <a:schemeClr val="accent1"/>
-          </a:fillRef>
-          <a:effectRef idx="0">
-            <a:schemeClr val="accent1"/>
-          </a:effectRef>
-          <a:fontRef idx="minor">
-            <a:schemeClr val="tx1"/>
-          </a:fontRef>
-        </p:style>
-      </p:cxnSp>
-      <p:cxnSp>
-        <p:nvCxnSpPr>
-          <p:cNvPr id="63" name="Connector: Elbow 62">
-            <a:extLst>
-              <a:ext uri="{FF2B5EF4-FFF2-40B4-BE49-F238E27FC236}">
-                <a16:creationId xmlns:a16="http://schemas.microsoft.com/office/drawing/2014/main" id="{BB0D8EA9-D2B3-4B8A-B841-6BD9480D7757}"/>
-              </a:ext>
-            </a:extLst>
-          </p:cNvPr>
-          <p:cNvCxnSpPr>
-            <a:cxnSpLocks/>
-            <a:endCxn id="18" idx="0"/>
-          </p:cNvCxnSpPr>
-          <p:nvPr/>
-        </p:nvCxnSpPr>
-        <p:spPr>
-          <a:xfrm rot="5400000">
-            <a:off x="8279295" y="1891745"/>
-            <a:ext cx="2024271" cy="2912170"/>
-          </a:xfrm>
-          <a:prstGeom prst="bentConnector3">
-            <a:avLst>
-              <a:gd name="adj1" fmla="val 50000"/>
-            </a:avLst>
-          </a:prstGeom>
-          <a:ln>
-            <a:tailEnd type="triangle"/>
-          </a:ln>
-        </p:spPr>
-        <p:style>
-          <a:lnRef idx="1">
-            <a:schemeClr val="accent1"/>
-          </a:lnRef>
-          <a:fillRef idx="0">
-            <a:schemeClr val="accent1"/>
-          </a:fillRef>
-          <a:effectRef idx="0">
-            <a:schemeClr val="accent1"/>
-          </a:effectRef>
-          <a:fontRef idx="minor">
-            <a:schemeClr val="tx1"/>
-          </a:fontRef>
-        </p:style>
-      </p:cxnSp>
-      <p:cxnSp>
-        <p:nvCxnSpPr>
-          <p:cNvPr id="66" name="Straight Arrow Connector 65">
-            <a:extLst>
-              <a:ext uri="{FF2B5EF4-FFF2-40B4-BE49-F238E27FC236}">
-                <a16:creationId xmlns:a16="http://schemas.microsoft.com/office/drawing/2014/main" id="{ED7C247C-9821-4DC1-B722-FAC7E2968394}"/>
-              </a:ext>
-            </a:extLst>
-          </p:cNvPr>
-          <p:cNvCxnSpPr>
-            <a:cxnSpLocks/>
-            <a:stCxn id="18" idx="3"/>
-            <a:endCxn id="76" idx="1"/>
-          </p:cNvCxnSpPr>
-          <p:nvPr/>
-        </p:nvCxnSpPr>
-        <p:spPr>
-          <a:xfrm>
-            <a:off x="8809379" y="4842014"/>
-            <a:ext cx="851452" cy="0"/>
-          </a:xfrm>
-          <a:prstGeom prst="straightConnector1">
-            <a:avLst/>
-          </a:prstGeom>
-          <a:ln>
-            <a:tailEnd type="triangle"/>
-          </a:ln>
-        </p:spPr>
-        <p:style>
-          <a:lnRef idx="1">
-            <a:schemeClr val="accent1"/>
-          </a:lnRef>
-          <a:fillRef idx="0">
-            <a:schemeClr val="accent1"/>
-          </a:fillRef>
-          <a:effectRef idx="0">
-            <a:schemeClr val="accent1"/>
-          </a:effectRef>
-          <a:fontRef idx="minor">
-            <a:schemeClr val="tx1"/>
-          </a:fontRef>
-        </p:style>
-      </p:cxnSp>
-      <p:sp>
-        <p:nvSpPr>
-          <p:cNvPr id="68" name="TextBox 67">
-            <a:extLst>
-              <a:ext uri="{FF2B5EF4-FFF2-40B4-BE49-F238E27FC236}">
-                <a16:creationId xmlns:a16="http://schemas.microsoft.com/office/drawing/2014/main" id="{9E750096-7A3A-4E11-804F-E28FAEEB99C1}"/>
-              </a:ext>
-            </a:extLst>
-          </p:cNvPr>
-          <p:cNvSpPr txBox="1"/>
-          <p:nvPr/>
-        </p:nvSpPr>
-        <p:spPr>
-          <a:xfrm>
-            <a:off x="2421838" y="298174"/>
-            <a:ext cx="6761919" cy="461665"/>
-          </a:xfrm>
-          <a:prstGeom prst="rect">
-            <a:avLst/>
-          </a:prstGeom>
-          <a:noFill/>
-        </p:spPr>
-        <p:txBody>
-          <a:bodyPr wrap="square" rtlCol="0">
-            <a:spAutoFit/>
-          </a:bodyPr>
-          <a:lstStyle/>
-          <a:p>
-            <a:pPr algn="ctr"/>
-            <a:r>
-              <a:rPr lang="en-US" sz="2400" b="1" dirty="0"/>
-              <a:t>Data Analysis Pipeline for Telcom Customer Churn</a:t>
-            </a:r>
-            <a:endParaRPr lang="en-CA" sz="2400" b="1" dirty="0"/>
-          </a:p>
-        </p:txBody>
-      </p:sp>
-      <p:sp>
-        <p:nvSpPr>
-          <p:cNvPr id="73" name="Flowchart: Predefined Process 72">
-            <a:extLst>
-              <a:ext uri="{FF2B5EF4-FFF2-40B4-BE49-F238E27FC236}">
-                <a16:creationId xmlns:a16="http://schemas.microsoft.com/office/drawing/2014/main" id="{B41855FD-0D9A-4961-9219-A2CD9CF6F20B}"/>
-              </a:ext>
-            </a:extLst>
-          </p:cNvPr>
-          <p:cNvSpPr/>
-          <p:nvPr/>
-        </p:nvSpPr>
-        <p:spPr>
-          <a:xfrm>
-            <a:off x="10111410" y="1302027"/>
-            <a:ext cx="1245701" cy="1108210"/>
-          </a:xfrm>
-          <a:prstGeom prst="flowChartPredefinedProcess">
-            <a:avLst/>
-          </a:prstGeom>
-        </p:spPr>
-        <p:style>
-          <a:lnRef idx="2">
-            <a:schemeClr val="accent1">
-              <a:shade val="50000"/>
-            </a:schemeClr>
-          </a:lnRef>
-          <a:fillRef idx="1">
-            <a:schemeClr val="accent1"/>
-          </a:fillRef>
-          <a:effectRef idx="0">
-            <a:schemeClr val="accent1"/>
-          </a:effectRef>
-          <a:fontRef idx="minor">
-            <a:schemeClr val="lt1"/>
-          </a:fontRef>
-        </p:style>
-        <p:txBody>
-          <a:bodyPr rtlCol="0" anchor="ctr"/>
-          <a:lstStyle/>
-          <a:p>
-            <a:pPr algn="ctr"/>
-            <a:r>
-              <a:rPr lang="en-US" dirty="0"/>
-              <a:t>Results/eda.png</a:t>
-            </a:r>
-            <a:endParaRPr lang="en-CA" dirty="0"/>
-          </a:p>
-        </p:txBody>
-      </p:sp>
-      <p:sp>
-        <p:nvSpPr>
-          <p:cNvPr id="76" name="Flowchart: Predefined Process 75">
-            <a:extLst>
-              <a:ext uri="{FF2B5EF4-FFF2-40B4-BE49-F238E27FC236}">
-                <a16:creationId xmlns:a16="http://schemas.microsoft.com/office/drawing/2014/main" id="{46375720-DE8B-4D6A-83DA-AE6A23349353}"/>
-              </a:ext>
-            </a:extLst>
-          </p:cNvPr>
-          <p:cNvSpPr/>
-          <p:nvPr/>
-        </p:nvSpPr>
-        <p:spPr>
-          <a:xfrm>
-            <a:off x="9660831" y="4359966"/>
-            <a:ext cx="1848683" cy="964096"/>
-          </a:xfrm>
-          <a:prstGeom prst="flowChartPredefinedProcess">
-            <a:avLst/>
-          </a:prstGeom>
-        </p:spPr>
-        <p:style>
-          <a:lnRef idx="2">
-            <a:schemeClr val="accent1">
-              <a:shade val="50000"/>
-            </a:schemeClr>
-          </a:lnRef>
-          <a:fillRef idx="1">
-            <a:schemeClr val="accent1"/>
-          </a:fillRef>
-          <a:effectRef idx="0">
-            <a:schemeClr val="accent1"/>
-          </a:effectRef>
-          <a:fontRef idx="minor">
-            <a:schemeClr val="lt1"/>
-          </a:fontRef>
-        </p:style>
-        <p:txBody>
-          <a:bodyPr rtlCol="0" anchor="ctr"/>
-          <a:lstStyle/>
-          <a:p>
-            <a:pPr algn="ctr"/>
-            <a:r>
-              <a:rPr lang="en-US" dirty="0"/>
-              <a:t>doc/analysis_report.pdf</a:t>
-            </a:r>
-            <a:endParaRPr lang="en-CA" dirty="0"/>
-          </a:p>
-        </p:txBody>
-      </p:sp>
-      <p:sp>
-        <p:nvSpPr>
-          <p:cNvPr id="78" name="Flowchart: Predefined Process 77">
-            <a:extLst>
-              <a:ext uri="{FF2B5EF4-FFF2-40B4-BE49-F238E27FC236}">
-                <a16:creationId xmlns:a16="http://schemas.microsoft.com/office/drawing/2014/main" id="{06349101-2C85-445D-8700-8F34249C67A0}"/>
-              </a:ext>
-            </a:extLst>
-          </p:cNvPr>
-          <p:cNvSpPr/>
-          <p:nvPr/>
-        </p:nvSpPr>
-        <p:spPr>
-          <a:xfrm>
-            <a:off x="3379311" y="5652052"/>
-            <a:ext cx="1785726" cy="904458"/>
-          </a:xfrm>
-          <a:prstGeom prst="flowChartPredefinedProcess">
-            <a:avLst/>
-          </a:prstGeom>
-        </p:spPr>
-        <p:style>
-          <a:lnRef idx="2">
-            <a:schemeClr val="accent1">
-              <a:shade val="50000"/>
-            </a:schemeClr>
-          </a:lnRef>
-          <a:fillRef idx="1">
-            <a:schemeClr val="accent1"/>
-          </a:fillRef>
-          <a:effectRef idx="0">
-            <a:schemeClr val="accent1"/>
-          </a:effectRef>
-          <a:fontRef idx="minor">
-            <a:schemeClr val="lt1"/>
-          </a:fontRef>
-        </p:style>
-        <p:txBody>
-          <a:bodyPr rtlCol="0" anchor="ctr"/>
-          <a:lstStyle/>
-          <a:p>
-            <a:pPr algn="ctr"/>
-            <a:r>
-              <a:rPr lang="en-US" dirty="0"/>
-              <a:t>results/test_result.png</a:t>
-            </a:r>
-            <a:endParaRPr lang="en-CA" dirty="0"/>
-          </a:p>
-        </p:txBody>
-      </p:sp>
-    </p:spTree>
-    <p:extLst>
-      <p:ext uri="{BB962C8B-B14F-4D97-AF65-F5344CB8AC3E}">
-        <p14:creationId xmlns:p14="http://schemas.microsoft.com/office/powerpoint/2010/main" val="2479154683"/>
-      </p:ext>
-    </p:extLst>
-  </p:cSld>
-  <p:clrMapOvr>
-    <a:masterClrMapping/>
-  </p:clrMapOvr>
-</p:sld>
-</file>
-
 <file path=ppt/theme/theme1.xml><?xml version="1.0" encoding="utf-8"?>
 <a:theme xmlns:a="http://schemas.openxmlformats.org/drawingml/2006/main" name="Office Theme">
   <a:themeElements>

</xml_diff>